<commit_message>
Fix nano component backtrack image
</commit_message>
<xml_diff>
--- a/images/back-component.pptx
+++ b/images/back-component.pptx
@@ -283,7 +283,7 @@
               <a:pPr>
                 <a:defRPr/>
               </a:pPr>
-              <a:t>11/4/2021</a:t>
+              <a:t>6/5/24</a:t>
             </a:fld>
             <a:endParaRPr lang="en-US" dirty="0"/>
           </a:p>
@@ -506,7 +506,7 @@
               <a:pPr>
                 <a:defRPr/>
               </a:pPr>
-              <a:t>11/4/2021</a:t>
+              <a:t>6/5/24</a:t>
             </a:fld>
             <a:endParaRPr lang="en-US" dirty="0"/>
           </a:p>
@@ -930,7 +930,7 @@
               </a14:hiddenLine>
             </a:ext>
             <a:ext uri="{FAA26D3D-D897-4be2-8F04-BA451C77F1D7}">
-              <ma14:placeholderFlag xmlns:ma14="http://schemas.microsoft.com/office/mac/drawingml/2011/main" xmlns="" val="1"/>
+              <ma14:placeholderFlag xmlns="" xmlns:ma14="http://schemas.microsoft.com/office/mac/drawingml/2011/main" val="1"/>
             </a:ext>
           </a:extLst>
         </p:spPr>
@@ -3219,6 +3219,137 @@
           </p:style>
         </p:cxnSp>
       </p:grpSp>
+      <p:grpSp>
+        <p:nvGrpSpPr>
+          <p:cNvPr id="11" name="Group 10">
+            <a:extLst>
+              <a:ext uri="{FF2B5EF4-FFF2-40B4-BE49-F238E27FC236}">
+                <a16:creationId xmlns:a16="http://schemas.microsoft.com/office/drawing/2014/main" id="{B3D036C1-8D97-E7D2-40AF-9B77B9CA2BD6}"/>
+              </a:ext>
+            </a:extLst>
+          </p:cNvPr>
+          <p:cNvGrpSpPr/>
+          <p:nvPr/>
+        </p:nvGrpSpPr>
+        <p:grpSpPr>
+          <a:xfrm>
+            <a:off x="2729070" y="2354851"/>
+            <a:ext cx="432000" cy="432000"/>
+            <a:chOff x="4191814" y="2574518"/>
+            <a:chExt cx="432000" cy="432000"/>
+          </a:xfrm>
+        </p:grpSpPr>
+        <p:sp>
+          <p:nvSpPr>
+            <p:cNvPr id="9" name="Rectangle 8">
+              <a:extLst>
+                <a:ext uri="{FF2B5EF4-FFF2-40B4-BE49-F238E27FC236}">
+                  <a16:creationId xmlns:a16="http://schemas.microsoft.com/office/drawing/2014/main" id="{736E2FBD-16E1-AC07-A468-C11FF32CDF7E}"/>
+                </a:ext>
+              </a:extLst>
+            </p:cNvPr>
+            <p:cNvSpPr>
+              <a:spLocks noChangeAspect="1"/>
+            </p:cNvSpPr>
+            <p:nvPr/>
+          </p:nvSpPr>
+          <p:spPr>
+            <a:xfrm rot="18900000">
+              <a:off x="4351812" y="2574518"/>
+              <a:ext cx="118727" cy="432000"/>
+            </a:xfrm>
+            <a:prstGeom prst="rect">
+              <a:avLst/>
+            </a:prstGeom>
+            <a:solidFill>
+              <a:schemeClr val="accent6"/>
+            </a:solidFill>
+            <a:ln>
+              <a:noFill/>
+            </a:ln>
+            <a:effectLst/>
+          </p:spPr>
+          <p:style>
+            <a:lnRef idx="2">
+              <a:schemeClr val="accent1">
+                <a:shade val="50000"/>
+              </a:schemeClr>
+            </a:lnRef>
+            <a:fillRef idx="1">
+              <a:schemeClr val="accent1"/>
+            </a:fillRef>
+            <a:effectRef idx="0">
+              <a:schemeClr val="accent1"/>
+            </a:effectRef>
+            <a:fontRef idx="minor">
+              <a:schemeClr val="lt1"/>
+            </a:fontRef>
+          </p:style>
+          <p:txBody>
+            <a:bodyPr rtlCol="0" anchor="ctr"/>
+            <a:lstStyle/>
+            <a:p>
+              <a:pPr algn="ctr"/>
+              <a:endParaRPr lang="en-SI" dirty="0"/>
+            </a:p>
+          </p:txBody>
+        </p:sp>
+        <p:sp>
+          <p:nvSpPr>
+            <p:cNvPr id="10" name="Rectangle 9">
+              <a:extLst>
+                <a:ext uri="{FF2B5EF4-FFF2-40B4-BE49-F238E27FC236}">
+                  <a16:creationId xmlns:a16="http://schemas.microsoft.com/office/drawing/2014/main" id="{CB119CAA-A2BD-9BB8-E21C-3D0ABA6E9749}"/>
+                </a:ext>
+              </a:extLst>
+            </p:cNvPr>
+            <p:cNvSpPr>
+              <a:spLocks noChangeAspect="1"/>
+            </p:cNvSpPr>
+            <p:nvPr/>
+          </p:nvSpPr>
+          <p:spPr>
+            <a:xfrm rot="2700000">
+              <a:off x="4348450" y="2573039"/>
+              <a:ext cx="118727" cy="432000"/>
+            </a:xfrm>
+            <a:prstGeom prst="rect">
+              <a:avLst/>
+            </a:prstGeom>
+            <a:solidFill>
+              <a:schemeClr val="accent6"/>
+            </a:solidFill>
+            <a:ln>
+              <a:noFill/>
+            </a:ln>
+            <a:effectLst/>
+          </p:spPr>
+          <p:style>
+            <a:lnRef idx="2">
+              <a:schemeClr val="accent1">
+                <a:shade val="50000"/>
+              </a:schemeClr>
+            </a:lnRef>
+            <a:fillRef idx="1">
+              <a:schemeClr val="accent1"/>
+            </a:fillRef>
+            <a:effectRef idx="0">
+              <a:schemeClr val="accent1"/>
+            </a:effectRef>
+            <a:fontRef idx="minor">
+              <a:schemeClr val="lt1"/>
+            </a:fontRef>
+          </p:style>
+          <p:txBody>
+            <a:bodyPr rtlCol="0" anchor="ctr"/>
+            <a:lstStyle/>
+            <a:p>
+              <a:pPr algn="ctr"/>
+              <a:endParaRPr lang="en-SI" dirty="0"/>
+            </a:p>
+          </p:txBody>
+        </p:sp>
+      </p:grpSp>
     </p:spTree>
     <p:extLst>
       <p:ext uri="{BB962C8B-B14F-4D97-AF65-F5344CB8AC3E}">
@@ -4160,20 +4291,20 @@
 </file>
 
 <file path=customXml/item1.xml><?xml version="1.0" encoding="utf-8"?>
-<p:properties xmlns:p="http://schemas.microsoft.com/office/2006/metadata/properties" xmlns:xsi="http://www.w3.org/2001/XMLSchema-instance" xmlns:pc="http://schemas.microsoft.com/office/infopath/2007/PartnerControls">
-  <documentManagement>
-    <x0h2 xmlns="34968e7b-9d4e-4a89-8768-2a6d2a4b1992" xsi:nil="true"/>
-  </documentManagement>
-</p:properties>
-</file>
-
-<file path=customXml/item2.xml><?xml version="1.0" encoding="utf-8"?>
 <?mso-contentType ?>
 <FormTemplates xmlns="http://schemas.microsoft.com/sharepoint/v3/contenttype/forms">
   <Display>DocumentLibraryForm</Display>
   <Edit>DocumentLibraryForm</Edit>
   <New>DocumentLibraryForm</New>
 </FormTemplates>
+</file>
+
+<file path=customXml/item2.xml><?xml version="1.0" encoding="utf-8"?>
+<p:properties xmlns:p="http://schemas.microsoft.com/office/2006/metadata/properties" xmlns:xsi="http://www.w3.org/2001/XMLSchema-instance" xmlns:pc="http://schemas.microsoft.com/office/infopath/2007/PartnerControls">
+  <documentManagement>
+    <x0h2 xmlns="34968e7b-9d4e-4a89-8768-2a6d2a4b1992" xsi:nil="true"/>
+  </documentManagement>
+</p:properties>
 </file>
 
 <file path=customXml/item3.xml><?xml version="1.0" encoding="utf-8"?>
@@ -4394,6 +4525,14 @@
 </file>
 
 <file path=customXml/itemProps1.xml><?xml version="1.0" encoding="utf-8"?>
+<ds:datastoreItem xmlns:ds="http://schemas.openxmlformats.org/officeDocument/2006/customXml" ds:itemID="{7DE97B48-5A2B-4B7A-A549-0A8718B50E56}">
+  <ds:schemaRefs>
+    <ds:schemaRef ds:uri="http://schemas.microsoft.com/sharepoint/v3/contenttype/forms"/>
+  </ds:schemaRefs>
+</ds:datastoreItem>
+</file>
+
+<file path=customXml/itemProps2.xml><?xml version="1.0" encoding="utf-8"?>
 <ds:datastoreItem xmlns:ds="http://schemas.openxmlformats.org/officeDocument/2006/customXml" ds:itemID="{B3D56160-6CAC-411B-BC9E-725DD541A968}">
   <ds:schemaRefs>
     <ds:schemaRef ds:uri="http://purl.org/dc/dcmitype/"/>
@@ -4406,14 +4545,6 @@
     <ds:schemaRef ds:uri="http://schemas.microsoft.com/office/infopath/2007/PartnerControls"/>
     <ds:schemaRef ds:uri="http://schemas.openxmlformats.org/package/2006/metadata/core-properties"/>
     <ds:schemaRef ds:uri="http://schemas.microsoft.com/office/2006/metadata/properties"/>
-  </ds:schemaRefs>
-</ds:datastoreItem>
-</file>
-
-<file path=customXml/itemProps2.xml><?xml version="1.0" encoding="utf-8"?>
-<ds:datastoreItem xmlns:ds="http://schemas.openxmlformats.org/officeDocument/2006/customXml" ds:itemID="{7DE97B48-5A2B-4B7A-A549-0A8718B50E56}">
-  <ds:schemaRefs>
-    <ds:schemaRef ds:uri="http://schemas.microsoft.com/sharepoint/v3/contenttype/forms"/>
   </ds:schemaRefs>
 </ds:datastoreItem>
 </file>

</xml_diff>